<commit_message>
Profitability and AI brochure
Profitability and AI brochure
</commit_message>
<xml_diff>
--- a/Offline/BusinessManagement/Marketing/AI marketing/AIBrochure.pptx
+++ b/Offline/BusinessManagement/Marketing/AI marketing/AIBrochure.pptx
@@ -8227,7 +8227,7 @@
                 </a:solidFill>
                 <a:latin typeface="Oxygen" panose="02000503000000000000" pitchFamily="2" charset="0"/>
               </a:rPr>
-              <a:t>Dev Ops</a:t>
+              <a:t>Dev Ops (Kubernetes)</a:t>
             </a:r>
           </a:p>
           <a:p>
@@ -8301,7 +8301,7 @@
                 </a:solidFill>
                 <a:latin typeface="Oxygen" panose="02000503000000000000" pitchFamily="2" charset="0"/>
               </a:rPr>
-              <a:t>₹ 20,000/-</a:t>
+              <a:t>₹ 40,000/-</a:t>
             </a:r>
             <a:endParaRPr lang="en-US" sz="1000" b="1" strike="sngStrike" dirty="0">
               <a:solidFill>
@@ -8376,8 +8376,8 @@
         </p:nvSpPr>
         <p:spPr>
           <a:xfrm rot="21311287">
-            <a:off x="4386089" y="7122114"/>
-            <a:ext cx="1462073" cy="566744"/>
+            <a:off x="4385945" y="7118688"/>
+            <a:ext cx="1543756" cy="566744"/>
           </a:xfrm>
           <a:prstGeom prst="star32">
             <a:avLst>
@@ -8430,7 +8430,7 @@
                 </a:solidFill>
                 <a:latin typeface="Oxygen" panose="02000503000000000000" pitchFamily="2" charset="0"/>
               </a:rPr>
-              <a:t>10,000/-</a:t>
+              <a:t>20,000/-</a:t>
             </a:r>
             <a:endParaRPr lang="en-US" b="1" dirty="0">
               <a:solidFill>

</xml_diff>